<commit_message>
updated presentation slides and added script doc
</commit_message>
<xml_diff>
--- a/ParkmasterPresentationDraft.pptx
+++ b/ParkmasterPresentationDraft.pptx
@@ -6,14 +6,14 @@
   </p:sldMasterIdLst>
   <p:sldIdLst>
     <p:sldId id="256" r:id="rId2"/>
-    <p:sldId id="257" r:id="rId3"/>
-    <p:sldId id="260" r:id="rId4"/>
-    <p:sldId id="261" r:id="rId5"/>
-    <p:sldId id="262" r:id="rId6"/>
-    <p:sldId id="258" r:id="rId7"/>
-    <p:sldId id="259" r:id="rId8"/>
-    <p:sldId id="263" r:id="rId9"/>
-    <p:sldId id="264" r:id="rId10"/>
+    <p:sldId id="265" r:id="rId3"/>
+    <p:sldId id="259" r:id="rId4"/>
+    <p:sldId id="257" r:id="rId5"/>
+    <p:sldId id="260" r:id="rId6"/>
+    <p:sldId id="263" r:id="rId7"/>
+    <p:sldId id="264" r:id="rId8"/>
+    <p:sldId id="261" r:id="rId9"/>
+    <p:sldId id="262" r:id="rId10"/>
   </p:sldIdLst>
   <p:sldSz cx="12192000" cy="6858000"/>
   <p:notesSz cx="6858000" cy="9144000"/>
@@ -118,14 +118,14 @@
         <p14:section name="Untitled Section" id="{897DBC44-C1C6-F443-8076-654296E37C04}">
           <p14:sldIdLst>
             <p14:sldId id="256"/>
+            <p14:sldId id="265"/>
+            <p14:sldId id="259"/>
             <p14:sldId id="257"/>
             <p14:sldId id="260"/>
+            <p14:sldId id="263"/>
+            <p14:sldId id="264"/>
             <p14:sldId id="261"/>
             <p14:sldId id="262"/>
-            <p14:sldId id="258"/>
-            <p14:sldId id="259"/>
-            <p14:sldId id="263"/>
-            <p14:sldId id="264"/>
           </p14:sldIdLst>
         </p14:section>
       </p14:sectionLst>
@@ -300,7 +300,7 @@
           <a:p>
             <a:fld id="{6444479B-705B-4489-957E-7E8A228BDFA0}" type="datetime1">
               <a:rPr lang="en-US" smtClean="0"/>
-              <a:t>11/11/2025</a:t>
+              <a:t>11/12/2025</a:t>
             </a:fld>
             <a:endParaRPr lang="en-US"/>
           </a:p>
@@ -539,7 +539,7 @@
           <a:p>
             <a:fld id="{7DA38F49-B3E2-4BF0-BEC7-C30D34ABBB8D}" type="datetime1">
               <a:rPr lang="en-US" smtClean="0"/>
-              <a:t>11/11/2025</a:t>
+              <a:t>11/12/2025</a:t>
             </a:fld>
             <a:endParaRPr lang="en-US"/>
           </a:p>
@@ -1409,6 +1409,181 @@
           <p:cNvPr id="2" name="Title 1">
             <a:extLst>
               <a:ext uri="{FF2B5EF4-FFF2-40B4-BE49-F238E27FC236}">
+                <a16:creationId xmlns:a16="http://schemas.microsoft.com/office/drawing/2014/main" id="{2574632E-A54A-700C-55A3-EA11A14F1543}"/>
+              </a:ext>
+            </a:extLst>
+          </p:cNvPr>
+          <p:cNvSpPr>
+            <a:spLocks noGrp="1"/>
+          </p:cNvSpPr>
+          <p:nvPr>
+            <p:ph type="ctrTitle"/>
+          </p:nvPr>
+        </p:nvSpPr>
+        <p:spPr/>
+        <p:txBody>
+          <a:bodyPr/>
+          <a:lstStyle/>
+          <a:p>
+            <a:r>
+              <a:rPr lang="en-US" dirty="0"/>
+              <a:t>Parking Trouble?</a:t>
+            </a:r>
+          </a:p>
+        </p:txBody>
+      </p:sp>
+      <p:sp>
+        <p:nvSpPr>
+          <p:cNvPr id="3" name="Subtitle 2">
+            <a:extLst>
+              <a:ext uri="{FF2B5EF4-FFF2-40B4-BE49-F238E27FC236}">
+                <a16:creationId xmlns:a16="http://schemas.microsoft.com/office/drawing/2014/main" id="{827A8DE9-A699-6C28-DD92-EDAF1CCB9D97}"/>
+              </a:ext>
+            </a:extLst>
+          </p:cNvPr>
+          <p:cNvSpPr>
+            <a:spLocks noGrp="1"/>
+          </p:cNvSpPr>
+          <p:nvPr>
+            <p:ph type="subTitle" idx="1"/>
+          </p:nvPr>
+        </p:nvSpPr>
+        <p:spPr/>
+        <p:txBody>
+          <a:bodyPr/>
+          <a:lstStyle/>
+          <a:p>
+            <a:endParaRPr lang="en-US"/>
+          </a:p>
+        </p:txBody>
+      </p:sp>
+    </p:spTree>
+    <p:extLst>
+      <p:ext uri="{BB962C8B-B14F-4D97-AF65-F5344CB8AC3E}">
+        <p14:creationId xmlns:p14="http://schemas.microsoft.com/office/powerpoint/2010/main" val="713243338"/>
+      </p:ext>
+    </p:extLst>
+  </p:cSld>
+  <p:clrMapOvr>
+    <a:masterClrMapping/>
+  </p:clrMapOvr>
+</p:sld>
+</file>
+
+<file path=ppt/slides/slide3.xml><?xml version="1.0" encoding="utf-8"?>
+<p:sld xmlns:a="http://schemas.openxmlformats.org/drawingml/2006/main" xmlns:r="http://schemas.openxmlformats.org/officeDocument/2006/relationships" xmlns:p="http://schemas.openxmlformats.org/presentationml/2006/main">
+  <p:cSld>
+    <p:spTree>
+      <p:nvGrpSpPr>
+        <p:cNvPr id="1" name=""/>
+        <p:cNvGrpSpPr/>
+        <p:nvPr/>
+      </p:nvGrpSpPr>
+      <p:grpSpPr>
+        <a:xfrm>
+          <a:off x="0" y="0"/>
+          <a:ext cx="0" cy="0"/>
+          <a:chOff x="0" y="0"/>
+          <a:chExt cx="0" cy="0"/>
+        </a:xfrm>
+      </p:grpSpPr>
+      <p:sp>
+        <p:nvSpPr>
+          <p:cNvPr id="2" name="Title 1">
+            <a:extLst>
+              <a:ext uri="{FF2B5EF4-FFF2-40B4-BE49-F238E27FC236}">
+                <a16:creationId xmlns:a16="http://schemas.microsoft.com/office/drawing/2014/main" id="{10BE3C38-6490-68B5-5ECF-DAA85D91E5E1}"/>
+              </a:ext>
+            </a:extLst>
+          </p:cNvPr>
+          <p:cNvSpPr>
+            <a:spLocks noGrp="1"/>
+          </p:cNvSpPr>
+          <p:nvPr>
+            <p:ph type="ctrTitle"/>
+          </p:nvPr>
+        </p:nvSpPr>
+        <p:spPr/>
+        <p:txBody>
+          <a:bodyPr/>
+          <a:lstStyle/>
+          <a:p>
+            <a:r>
+              <a:rPr lang="en-US" dirty="0"/>
+              <a:t>User Demo</a:t>
+            </a:r>
+            <a:br>
+              <a:rPr lang="en-US" dirty="0"/>
+            </a:br>
+            <a:endParaRPr lang="en-US" dirty="0"/>
+          </a:p>
+        </p:txBody>
+      </p:sp>
+      <p:sp>
+        <p:nvSpPr>
+          <p:cNvPr id="3" name="Subtitle 2">
+            <a:extLst>
+              <a:ext uri="{FF2B5EF4-FFF2-40B4-BE49-F238E27FC236}">
+                <a16:creationId xmlns:a16="http://schemas.microsoft.com/office/drawing/2014/main" id="{B4477A99-02FF-CDC9-607E-A914A0E3AFBF}"/>
+              </a:ext>
+            </a:extLst>
+          </p:cNvPr>
+          <p:cNvSpPr>
+            <a:spLocks noGrp="1"/>
+          </p:cNvSpPr>
+          <p:nvPr>
+            <p:ph type="subTitle" idx="1"/>
+          </p:nvPr>
+        </p:nvSpPr>
+        <p:spPr>
+          <a:xfrm>
+            <a:off x="640080" y="3405936"/>
+            <a:ext cx="6675120" cy="2466830"/>
+          </a:xfrm>
+        </p:spPr>
+        <p:txBody>
+          <a:bodyPr/>
+          <a:lstStyle/>
+          <a:p>
+            <a:endParaRPr lang="en-US" dirty="0"/>
+          </a:p>
+        </p:txBody>
+      </p:sp>
+    </p:spTree>
+    <p:extLst>
+      <p:ext uri="{BB962C8B-B14F-4D97-AF65-F5344CB8AC3E}">
+        <p14:creationId xmlns:p14="http://schemas.microsoft.com/office/powerpoint/2010/main" val="2301174596"/>
+      </p:ext>
+    </p:extLst>
+  </p:cSld>
+  <p:clrMapOvr>
+    <a:masterClrMapping/>
+  </p:clrMapOvr>
+</p:sld>
+</file>
+
+<file path=ppt/slides/slide4.xml><?xml version="1.0" encoding="utf-8"?>
+<p:sld xmlns:a="http://schemas.openxmlformats.org/drawingml/2006/main" xmlns:r="http://schemas.openxmlformats.org/officeDocument/2006/relationships" xmlns:p="http://schemas.openxmlformats.org/presentationml/2006/main">
+  <p:cSld>
+    <p:spTree>
+      <p:nvGrpSpPr>
+        <p:cNvPr id="1" name=""/>
+        <p:cNvGrpSpPr/>
+        <p:nvPr/>
+      </p:nvGrpSpPr>
+      <p:grpSpPr>
+        <a:xfrm>
+          <a:off x="0" y="0"/>
+          <a:ext cx="0" cy="0"/>
+          <a:chOff x="0" y="0"/>
+          <a:chExt cx="0" cy="0"/>
+        </a:xfrm>
+      </p:grpSpPr>
+      <p:sp>
+        <p:nvSpPr>
+          <p:cNvPr id="2" name="Title 1">
+            <a:extLst>
+              <a:ext uri="{FF2B5EF4-FFF2-40B4-BE49-F238E27FC236}">
                 <a16:creationId xmlns:a16="http://schemas.microsoft.com/office/drawing/2014/main" id="{785BFF9A-9296-AC95-440F-A75360641E9A}"/>
               </a:ext>
             </a:extLst>
@@ -1513,7 +1688,7 @@
 </p:sld>
 </file>
 
-<file path=ppt/slides/slide3.xml><?xml version="1.0" encoding="utf-8"?>
+<file path=ppt/slides/slide5.xml><?xml version="1.0" encoding="utf-8"?>
 <p:sld xmlns:a="http://schemas.openxmlformats.org/drawingml/2006/main" xmlns:r="http://schemas.openxmlformats.org/officeDocument/2006/relationships" xmlns:p="http://schemas.openxmlformats.org/presentationml/2006/main">
   <p:cSld>
     <p:bg>
@@ -1772,188 +1947,6 @@
 </p:sld>
 </file>
 
-<file path=ppt/slides/slide4.xml><?xml version="1.0" encoding="utf-8"?>
-<p:sld xmlns:a="http://schemas.openxmlformats.org/drawingml/2006/main" xmlns:r="http://schemas.openxmlformats.org/officeDocument/2006/relationships" xmlns:p="http://schemas.openxmlformats.org/presentationml/2006/main">
-  <p:cSld>
-    <p:spTree>
-      <p:nvGrpSpPr>
-        <p:cNvPr id="1" name=""/>
-        <p:cNvGrpSpPr/>
-        <p:nvPr/>
-      </p:nvGrpSpPr>
-      <p:grpSpPr>
-        <a:xfrm>
-          <a:off x="0" y="0"/>
-          <a:ext cx="0" cy="0"/>
-          <a:chOff x="0" y="0"/>
-          <a:chExt cx="0" cy="0"/>
-        </a:xfrm>
-      </p:grpSpPr>
-      <p:sp>
-        <p:nvSpPr>
-          <p:cNvPr id="2" name="Title 1">
-            <a:extLst>
-              <a:ext uri="{FF2B5EF4-FFF2-40B4-BE49-F238E27FC236}">
-                <a16:creationId xmlns:a16="http://schemas.microsoft.com/office/drawing/2014/main" id="{5EC9A88B-7230-46A7-037B-B121802563ED}"/>
-              </a:ext>
-            </a:extLst>
-          </p:cNvPr>
-          <p:cNvSpPr>
-            <a:spLocks noGrp="1"/>
-          </p:cNvSpPr>
-          <p:nvPr>
-            <p:ph type="ctrTitle"/>
-          </p:nvPr>
-        </p:nvSpPr>
-        <p:spPr/>
-        <p:txBody>
-          <a:bodyPr>
-            <a:normAutofit/>
-          </a:bodyPr>
-          <a:lstStyle/>
-          <a:p>
-            <a:r>
-              <a:rPr lang="en-US"/>
-              <a:t>Database Model</a:t>
-            </a:r>
-            <a:br>
-              <a:rPr lang="en-US"/>
-            </a:br>
-            <a:r>
-              <a:rPr lang="en-US"/>
-              <a:t>(or at least plans)</a:t>
-            </a:r>
-          </a:p>
-        </p:txBody>
-      </p:sp>
-      <p:sp>
-        <p:nvSpPr>
-          <p:cNvPr id="3" name="Subtitle 2">
-            <a:extLst>
-              <a:ext uri="{FF2B5EF4-FFF2-40B4-BE49-F238E27FC236}">
-                <a16:creationId xmlns:a16="http://schemas.microsoft.com/office/drawing/2014/main" id="{683A63C5-F271-215C-866B-64FC4B656977}"/>
-              </a:ext>
-            </a:extLst>
-          </p:cNvPr>
-          <p:cNvSpPr>
-            <a:spLocks noGrp="1"/>
-          </p:cNvSpPr>
-          <p:nvPr>
-            <p:ph type="subTitle" idx="1"/>
-          </p:nvPr>
-        </p:nvSpPr>
-        <p:spPr/>
-        <p:txBody>
-          <a:bodyPr/>
-          <a:lstStyle/>
-          <a:p>
-            <a:endParaRPr lang="en-US"/>
-          </a:p>
-        </p:txBody>
-      </p:sp>
-    </p:spTree>
-    <p:extLst>
-      <p:ext uri="{BB962C8B-B14F-4D97-AF65-F5344CB8AC3E}">
-        <p14:creationId xmlns:p14="http://schemas.microsoft.com/office/powerpoint/2010/main" val="1572674956"/>
-      </p:ext>
-    </p:extLst>
-  </p:cSld>
-  <p:clrMapOvr>
-    <a:masterClrMapping/>
-  </p:clrMapOvr>
-</p:sld>
-</file>
-
-<file path=ppt/slides/slide5.xml><?xml version="1.0" encoding="utf-8"?>
-<p:sld xmlns:a="http://schemas.openxmlformats.org/drawingml/2006/main" xmlns:r="http://schemas.openxmlformats.org/officeDocument/2006/relationships" xmlns:p="http://schemas.openxmlformats.org/presentationml/2006/main">
-  <p:cSld>
-    <p:spTree>
-      <p:nvGrpSpPr>
-        <p:cNvPr id="1" name=""/>
-        <p:cNvGrpSpPr/>
-        <p:nvPr/>
-      </p:nvGrpSpPr>
-      <p:grpSpPr>
-        <a:xfrm>
-          <a:off x="0" y="0"/>
-          <a:ext cx="0" cy="0"/>
-          <a:chOff x="0" y="0"/>
-          <a:chExt cx="0" cy="0"/>
-        </a:xfrm>
-      </p:grpSpPr>
-      <p:sp>
-        <p:nvSpPr>
-          <p:cNvPr id="2" name="Title 1">
-            <a:extLst>
-              <a:ext uri="{FF2B5EF4-FFF2-40B4-BE49-F238E27FC236}">
-                <a16:creationId xmlns:a16="http://schemas.microsoft.com/office/drawing/2014/main" id="{4E0A3434-5241-144A-CD91-6AEE420D9C98}"/>
-              </a:ext>
-            </a:extLst>
-          </p:cNvPr>
-          <p:cNvSpPr>
-            <a:spLocks noGrp="1"/>
-          </p:cNvSpPr>
-          <p:nvPr>
-            <p:ph type="ctrTitle"/>
-          </p:nvPr>
-        </p:nvSpPr>
-        <p:spPr/>
-        <p:txBody>
-          <a:bodyPr/>
-          <a:lstStyle/>
-          <a:p>
-            <a:r>
-              <a:rPr lang="en-US"/>
-              <a:t>Human Technology Interaction Model</a:t>
-            </a:r>
-            <a:br>
-              <a:rPr lang="en-US"/>
-            </a:br>
-            <a:r>
-              <a:rPr lang="en-US"/>
-              <a:t>(or at least plans)</a:t>
-            </a:r>
-          </a:p>
-        </p:txBody>
-      </p:sp>
-      <p:sp>
-        <p:nvSpPr>
-          <p:cNvPr id="3" name="Subtitle 2">
-            <a:extLst>
-              <a:ext uri="{FF2B5EF4-FFF2-40B4-BE49-F238E27FC236}">
-                <a16:creationId xmlns:a16="http://schemas.microsoft.com/office/drawing/2014/main" id="{0F0F0F42-227A-BA70-072C-BAE86743CD48}"/>
-              </a:ext>
-            </a:extLst>
-          </p:cNvPr>
-          <p:cNvSpPr>
-            <a:spLocks noGrp="1"/>
-          </p:cNvSpPr>
-          <p:nvPr>
-            <p:ph type="subTitle" idx="1"/>
-          </p:nvPr>
-        </p:nvSpPr>
-        <p:spPr/>
-        <p:txBody>
-          <a:bodyPr/>
-          <a:lstStyle/>
-          <a:p>
-            <a:endParaRPr lang="en-US"/>
-          </a:p>
-        </p:txBody>
-      </p:sp>
-    </p:spTree>
-    <p:extLst>
-      <p:ext uri="{BB962C8B-B14F-4D97-AF65-F5344CB8AC3E}">
-        <p14:creationId xmlns:p14="http://schemas.microsoft.com/office/powerpoint/2010/main" val="2539600194"/>
-      </p:ext>
-    </p:extLst>
-  </p:cSld>
-  <p:clrMapOvr>
-    <a:masterClrMapping/>
-  </p:clrMapOvr>
-</p:sld>
-</file>
-
 <file path=ppt/slides/slide6.xml><?xml version="1.0" encoding="utf-8"?>
 <p:sld xmlns:a="http://schemas.openxmlformats.org/drawingml/2006/main" xmlns:r="http://schemas.openxmlformats.org/officeDocument/2006/relationships" xmlns:p="http://schemas.openxmlformats.org/presentationml/2006/main">
   <p:cSld>
@@ -1976,7 +1969,7 @@
           <p:cNvPr id="2" name="Title 1">
             <a:extLst>
               <a:ext uri="{FF2B5EF4-FFF2-40B4-BE49-F238E27FC236}">
-                <a16:creationId xmlns:a16="http://schemas.microsoft.com/office/drawing/2014/main" id="{A8156711-60B7-F662-4131-72CB5545EDC1}"/>
+                <a16:creationId xmlns:a16="http://schemas.microsoft.com/office/drawing/2014/main" id="{69A19A6E-6BF7-357C-33CD-48A01F4405A2}"/>
               </a:ext>
             </a:extLst>
           </p:cNvPr>
@@ -1994,15 +1987,8 @@
           <a:p>
             <a:r>
               <a:rPr lang="en-US"/>
-              <a:t>Demo pt. 1 </a:t>
+              <a:t>Questions?</a:t>
             </a:r>
-            <a:br>
-              <a:rPr lang="en-US"/>
-            </a:br>
-            <a:r>
-              <a:rPr lang="en-US"/>
-              <a:t>(admin side)</a:t>
-            </a:r>
           </a:p>
         </p:txBody>
       </p:sp>
@@ -2011,7 +1997,7 @@
           <p:cNvPr id="3" name="Subtitle 2">
             <a:extLst>
               <a:ext uri="{FF2B5EF4-FFF2-40B4-BE49-F238E27FC236}">
-                <a16:creationId xmlns:a16="http://schemas.microsoft.com/office/drawing/2014/main" id="{68CAFA2B-68AD-5549-F0A8-BD845A420795}"/>
+                <a16:creationId xmlns:a16="http://schemas.microsoft.com/office/drawing/2014/main" id="{AC36D847-5E76-B367-7DF8-CFEA98466B64}"/>
               </a:ext>
             </a:extLst>
           </p:cNvPr>
@@ -2022,56 +2008,19 @@
             <p:ph type="subTitle" idx="1"/>
           </p:nvPr>
         </p:nvSpPr>
-        <p:spPr>
-          <a:xfrm>
-            <a:off x="640080" y="3434691"/>
-            <a:ext cx="6675120" cy="2438075"/>
-          </a:xfrm>
-        </p:spPr>
-        <p:txBody>
-          <a:bodyPr>
-            <a:normAutofit/>
-          </a:bodyPr>
+        <p:spPr/>
+        <p:txBody>
+          <a:bodyPr/>
           <a:lstStyle/>
           <a:p>
-            <a:r>
-              <a:rPr lang="en-US" dirty="0"/>
-              <a:t>Showcase:</a:t>
-            </a:r>
-          </a:p>
-          <a:p>
-            <a:pPr marL="285750" indent="-285750">
-              <a:buChar char="•"/>
-            </a:pPr>
-            <a:r>
-              <a:rPr lang="en-US" dirty="0"/>
-              <a:t>Lot manager -&gt; new parking lot maker</a:t>
-            </a:r>
-          </a:p>
-          <a:p>
-            <a:pPr marL="285750" indent="-285750">
-              <a:buChar char="•"/>
-            </a:pPr>
-            <a:r>
-              <a:rPr lang="en-US" dirty="0"/>
-              <a:t>Schedule</a:t>
-            </a:r>
-          </a:p>
-          <a:p>
-            <a:pPr marL="285750" indent="-285750">
-              <a:buChar char="•"/>
-            </a:pPr>
-            <a:r>
-              <a:rPr lang="en-US" dirty="0"/>
-              <a:t>Users -&gt; Create and delete users</a:t>
-            </a:r>
+            <a:endParaRPr lang="en-US"/>
           </a:p>
         </p:txBody>
       </p:sp>
     </p:spTree>
     <p:extLst>
       <p:ext uri="{BB962C8B-B14F-4D97-AF65-F5344CB8AC3E}">
-        <p14:creationId xmlns:p14="http://schemas.microsoft.com/office/powerpoint/2010/main" val="1420367184"/>
+        <p14:creationId xmlns:p14="http://schemas.microsoft.com/office/powerpoint/2010/main" val="3217321395"/>
       </p:ext>
     </p:extLst>
   </p:cSld>
@@ -2103,7 +2052,7 @@
           <p:cNvPr id="2" name="Title 1">
             <a:extLst>
               <a:ext uri="{FF2B5EF4-FFF2-40B4-BE49-F238E27FC236}">
-                <a16:creationId xmlns:a16="http://schemas.microsoft.com/office/drawing/2014/main" id="{10BE3C38-6490-68B5-5ECF-DAA85D91E5E1}"/>
+                <a16:creationId xmlns:a16="http://schemas.microsoft.com/office/drawing/2014/main" id="{21FCAB83-698B-B3F0-7B51-7ECDCFEFFA2E}"/>
               </a:ext>
             </a:extLst>
           </p:cNvPr>
@@ -2121,15 +2070,8 @@
           <a:p>
             <a:r>
               <a:rPr lang="en-US"/>
-              <a:t>Demo pt. 2</a:t>
+              <a:t>Thanks For Listening</a:t>
             </a:r>
-            <a:br>
-              <a:rPr lang="en-US"/>
-            </a:br>
-            <a:r>
-              <a:rPr lang="en-US"/>
-              <a:t>(user side)</a:t>
-            </a:r>
           </a:p>
         </p:txBody>
       </p:sp>
@@ -2138,7 +2080,7 @@
           <p:cNvPr id="3" name="Subtitle 2">
             <a:extLst>
               <a:ext uri="{FF2B5EF4-FFF2-40B4-BE49-F238E27FC236}">
-                <a16:creationId xmlns:a16="http://schemas.microsoft.com/office/drawing/2014/main" id="{B4477A99-02FF-CDC9-607E-A914A0E3AFBF}"/>
+                <a16:creationId xmlns:a16="http://schemas.microsoft.com/office/drawing/2014/main" id="{15E12216-A848-91D5-D3A3-801B5137FCF7}"/>
               </a:ext>
             </a:extLst>
           </p:cNvPr>
@@ -2149,61 +2091,19 @@
             <p:ph type="subTitle" idx="1"/>
           </p:nvPr>
         </p:nvSpPr>
-        <p:spPr>
-          <a:xfrm>
-            <a:off x="640080" y="3405936"/>
-            <a:ext cx="6675120" cy="2466830"/>
-          </a:xfrm>
-        </p:spPr>
+        <p:spPr/>
         <p:txBody>
           <a:bodyPr/>
           <a:lstStyle/>
           <a:p>
-            <a:r>
-              <a:rPr lang="en-US" dirty="0"/>
-              <a:t>Showcase:</a:t>
-            </a:r>
             <a:endParaRPr lang="en-US"/>
-          </a:p>
-          <a:p>
-            <a:pPr marL="285750" indent="-285750">
-              <a:buChar char="•"/>
-            </a:pPr>
-            <a:r>
-              <a:rPr lang="en-US" dirty="0"/>
-              <a:t>Home -&gt; get Directions and view lots</a:t>
-            </a:r>
-          </a:p>
-          <a:p>
-            <a:pPr marL="285750" indent="-285750">
-              <a:buChar char="•"/>
-            </a:pPr>
-            <a:r>
-              <a:rPr lang="en-US" dirty="0"/>
-              <a:t>Schedule -&gt; Spot request</a:t>
-            </a:r>
-          </a:p>
-          <a:p>
-            <a:pPr marL="285750" indent="-285750">
-              <a:buChar char="•"/>
-            </a:pPr>
-            <a:r>
-              <a:rPr lang="en-US" dirty="0"/>
-              <a:t>Profile editing</a:t>
-            </a:r>
-          </a:p>
-          <a:p>
-            <a:pPr marL="285750" indent="-285750">
-              <a:buChar char="•"/>
-            </a:pPr>
-            <a:endParaRPr lang="en-US" dirty="0"/>
           </a:p>
         </p:txBody>
       </p:sp>
     </p:spTree>
     <p:extLst>
       <p:ext uri="{BB962C8B-B14F-4D97-AF65-F5344CB8AC3E}">
-        <p14:creationId xmlns:p14="http://schemas.microsoft.com/office/powerpoint/2010/main" val="2301174596"/>
+        <p14:creationId xmlns:p14="http://schemas.microsoft.com/office/powerpoint/2010/main" val="1449368243"/>
       </p:ext>
     </p:extLst>
   </p:cSld>
@@ -2235,7 +2135,7 @@
           <p:cNvPr id="2" name="Title 1">
             <a:extLst>
               <a:ext uri="{FF2B5EF4-FFF2-40B4-BE49-F238E27FC236}">
-                <a16:creationId xmlns:a16="http://schemas.microsoft.com/office/drawing/2014/main" id="{69A19A6E-6BF7-357C-33CD-48A01F4405A2}"/>
+                <a16:creationId xmlns:a16="http://schemas.microsoft.com/office/drawing/2014/main" id="{5EC9A88B-7230-46A7-037B-B121802563ED}"/>
               </a:ext>
             </a:extLst>
           </p:cNvPr>
@@ -2248,13 +2148,22 @@
         </p:nvSpPr>
         <p:spPr/>
         <p:txBody>
-          <a:bodyPr/>
+          <a:bodyPr>
+            <a:normAutofit/>
+          </a:bodyPr>
           <a:lstStyle/>
           <a:p>
             <a:r>
               <a:rPr lang="en-US"/>
-              <a:t>Questions?</a:t>
+              <a:t>Database Model</a:t>
             </a:r>
+            <a:br>
+              <a:rPr lang="en-US"/>
+            </a:br>
+            <a:r>
+              <a:rPr lang="en-US"/>
+              <a:t>(or at least plans)</a:t>
+            </a:r>
           </a:p>
         </p:txBody>
       </p:sp>
@@ -2263,7 +2172,7 @@
           <p:cNvPr id="3" name="Subtitle 2">
             <a:extLst>
               <a:ext uri="{FF2B5EF4-FFF2-40B4-BE49-F238E27FC236}">
-                <a16:creationId xmlns:a16="http://schemas.microsoft.com/office/drawing/2014/main" id="{AC36D847-5E76-B367-7DF8-CFEA98466B64}"/>
+                <a16:creationId xmlns:a16="http://schemas.microsoft.com/office/drawing/2014/main" id="{683A63C5-F271-215C-866B-64FC4B656977}"/>
               </a:ext>
             </a:extLst>
           </p:cNvPr>
@@ -2286,7 +2195,7 @@
     </p:spTree>
     <p:extLst>
       <p:ext uri="{BB962C8B-B14F-4D97-AF65-F5344CB8AC3E}">
-        <p14:creationId xmlns:p14="http://schemas.microsoft.com/office/powerpoint/2010/main" val="3217321395"/>
+        <p14:creationId xmlns:p14="http://schemas.microsoft.com/office/powerpoint/2010/main" val="1572674956"/>
       </p:ext>
     </p:extLst>
   </p:cSld>
@@ -2318,7 +2227,7 @@
           <p:cNvPr id="2" name="Title 1">
             <a:extLst>
               <a:ext uri="{FF2B5EF4-FFF2-40B4-BE49-F238E27FC236}">
-                <a16:creationId xmlns:a16="http://schemas.microsoft.com/office/drawing/2014/main" id="{21FCAB83-698B-B3F0-7B51-7ECDCFEFFA2E}"/>
+                <a16:creationId xmlns:a16="http://schemas.microsoft.com/office/drawing/2014/main" id="{4E0A3434-5241-144A-CD91-6AEE420D9C98}"/>
               </a:ext>
             </a:extLst>
           </p:cNvPr>
@@ -2336,8 +2245,15 @@
           <a:p>
             <a:r>
               <a:rPr lang="en-US"/>
-              <a:t>Thanks For Listening</a:t>
+              <a:t>Human Technology Interaction Model</a:t>
             </a:r>
+            <a:br>
+              <a:rPr lang="en-US"/>
+            </a:br>
+            <a:r>
+              <a:rPr lang="en-US"/>
+              <a:t>(or at least plans)</a:t>
+            </a:r>
           </a:p>
         </p:txBody>
       </p:sp>
@@ -2346,7 +2262,7 @@
           <p:cNvPr id="3" name="Subtitle 2">
             <a:extLst>
               <a:ext uri="{FF2B5EF4-FFF2-40B4-BE49-F238E27FC236}">
-                <a16:creationId xmlns:a16="http://schemas.microsoft.com/office/drawing/2014/main" id="{15E12216-A848-91D5-D3A3-801B5137FCF7}"/>
+                <a16:creationId xmlns:a16="http://schemas.microsoft.com/office/drawing/2014/main" id="{0F0F0F42-227A-BA70-072C-BAE86743CD48}"/>
               </a:ext>
             </a:extLst>
           </p:cNvPr>
@@ -2369,7 +2285,7 @@
     </p:spTree>
     <p:extLst>
       <p:ext uri="{BB962C8B-B14F-4D97-AF65-F5344CB8AC3E}">
-        <p14:creationId xmlns:p14="http://schemas.microsoft.com/office/powerpoint/2010/main" val="1449368243"/>
+        <p14:creationId xmlns:p14="http://schemas.microsoft.com/office/powerpoint/2010/main" val="2539600194"/>
       </p:ext>
     </p:extLst>
   </p:cSld>

</xml_diff>

<commit_message>
Changed vision statement a little
</commit_message>
<xml_diff>
--- a/ParkmasterPresentationDraft.pptx
+++ b/ParkmasterPresentationDraft.pptx
@@ -300,7 +300,7 @@
           <a:p>
             <a:fld id="{6444479B-705B-4489-957E-7E8A228BDFA0}" type="datetime1">
               <a:rPr lang="en-US" smtClean="0"/>
-              <a:t>11/12/2025</a:t>
+              <a:t>11/13/2025</a:t>
             </a:fld>
             <a:endParaRPr lang="en-US"/>
           </a:p>
@@ -539,7 +539,7 @@
           <a:p>
             <a:fld id="{7DA38F49-B3E2-4BF0-BEC7-C30D34ABBB8D}" type="datetime1">
               <a:rPr lang="en-US" smtClean="0"/>
-              <a:t>11/12/2025</a:t>
+              <a:t>11/13/2025</a:t>
             </a:fld>
             <a:endParaRPr lang="en-US"/>
           </a:p>
@@ -1625,8 +1625,8 @@
         </p:nvSpPr>
         <p:spPr>
           <a:xfrm>
-            <a:off x="640080" y="2859596"/>
-            <a:ext cx="6675120" cy="3013170"/>
+            <a:off x="640079" y="2428408"/>
+            <a:ext cx="8818714" cy="3057994"/>
           </a:xfrm>
         </p:spPr>
         <p:txBody>
@@ -1639,7 +1639,7 @@
               <a:buChar char="•"/>
             </a:pPr>
             <a:r>
-              <a:rPr lang="en-US"/>
+              <a:rPr lang="en-US" dirty="0"/>
               <a:t>TARGETED TOWARDS PRIVATE COMPANIES</a:t>
             </a:r>
           </a:p>
@@ -1648,7 +1648,7 @@
               <a:buChar char="•"/>
             </a:pPr>
             <a:r>
-              <a:rPr lang="en-US"/>
+              <a:rPr lang="en-US" dirty="0"/>
               <a:t>TOOL TO CREATE PARKING LOTS</a:t>
             </a:r>
           </a:p>
@@ -1657,8 +1657,8 @@
               <a:buChar char="•"/>
             </a:pPr>
             <a:r>
-              <a:rPr lang="en-US"/>
-              <a:t>INTERFACE TO MANAGE USERS AS ADMIN</a:t>
+              <a:rPr lang="en-US" dirty="0"/>
+              <a:t>Tool to help with organization and scheduling</a:t>
             </a:r>
           </a:p>
           <a:p>
@@ -1666,12 +1666,21 @@
               <a:buChar char="•"/>
             </a:pPr>
             <a:r>
-              <a:rPr lang="en-US"/>
+              <a:rPr lang="en-US" dirty="0"/>
+              <a:t>INTERFACE TO MANAGE USERS AS ADMIN</a:t>
+            </a:r>
+          </a:p>
+          <a:p>
+            <a:pPr marL="285750" indent="-285750">
+              <a:buChar char="•"/>
+            </a:pPr>
+            <a:r>
+              <a:rPr lang="en-US" dirty="0"/>
               <a:t>INTERFACE TO VIEW PARKING AS USER</a:t>
             </a:r>
           </a:p>
           <a:p>
-            <a:endParaRPr lang="en-US"/>
+            <a:endParaRPr lang="en-US" dirty="0"/>
           </a:p>
         </p:txBody>
       </p:sp>

</xml_diff>

<commit_message>
draft 3 of presentation
</commit_message>
<xml_diff>
--- a/ParkmasterPresentationDraft.pptx
+++ b/ParkmasterPresentationDraft.pptx
@@ -10,10 +10,9 @@
     <p:sldId id="259" r:id="rId4"/>
     <p:sldId id="257" r:id="rId5"/>
     <p:sldId id="260" r:id="rId6"/>
-    <p:sldId id="263" r:id="rId7"/>
-    <p:sldId id="264" r:id="rId8"/>
-    <p:sldId id="261" r:id="rId9"/>
-    <p:sldId id="262" r:id="rId10"/>
+    <p:sldId id="266" r:id="rId7"/>
+    <p:sldId id="263" r:id="rId8"/>
+    <p:sldId id="264" r:id="rId9"/>
   </p:sldIdLst>
   <p:sldSz cx="12192000" cy="6858000"/>
   <p:notesSz cx="6858000" cy="9144000"/>
@@ -122,10 +121,9 @@
             <p14:sldId id="259"/>
             <p14:sldId id="257"/>
             <p14:sldId id="260"/>
+            <p14:sldId id="266"/>
             <p14:sldId id="263"/>
             <p14:sldId id="264"/>
-            <p14:sldId id="261"/>
-            <p14:sldId id="262"/>
           </p14:sldIdLst>
         </p14:section>
       </p14:sectionLst>
@@ -1432,31 +1430,6 @@
           </a:p>
         </p:txBody>
       </p:sp>
-      <p:sp>
-        <p:nvSpPr>
-          <p:cNvPr id="3" name="Subtitle 2">
-            <a:extLst>
-              <a:ext uri="{FF2B5EF4-FFF2-40B4-BE49-F238E27FC236}">
-                <a16:creationId xmlns:a16="http://schemas.microsoft.com/office/drawing/2014/main" id="{827A8DE9-A699-6C28-DD92-EDAF1CCB9D97}"/>
-              </a:ext>
-            </a:extLst>
-          </p:cNvPr>
-          <p:cNvSpPr>
-            <a:spLocks noGrp="1"/>
-          </p:cNvSpPr>
-          <p:nvPr>
-            <p:ph type="subTitle" idx="1"/>
-          </p:nvPr>
-        </p:nvSpPr>
-        <p:spPr/>
-        <p:txBody>
-          <a:bodyPr/>
-          <a:lstStyle/>
-          <a:p>
-            <a:endParaRPr lang="en-US"/>
-          </a:p>
-        </p:txBody>
-      </p:sp>
     </p:spTree>
     <p:extLst>
       <p:ext uri="{BB962C8B-B14F-4D97-AF65-F5344CB8AC3E}">
@@ -1515,36 +1488,6 @@
             <a:br>
               <a:rPr lang="en-US" dirty="0"/>
             </a:br>
-            <a:endParaRPr lang="en-US" dirty="0"/>
-          </a:p>
-        </p:txBody>
-      </p:sp>
-      <p:sp>
-        <p:nvSpPr>
-          <p:cNvPr id="3" name="Subtitle 2">
-            <a:extLst>
-              <a:ext uri="{FF2B5EF4-FFF2-40B4-BE49-F238E27FC236}">
-                <a16:creationId xmlns:a16="http://schemas.microsoft.com/office/drawing/2014/main" id="{B4477A99-02FF-CDC9-607E-A914A0E3AFBF}"/>
-              </a:ext>
-            </a:extLst>
-          </p:cNvPr>
-          <p:cNvSpPr>
-            <a:spLocks noGrp="1"/>
-          </p:cNvSpPr>
-          <p:nvPr>
-            <p:ph type="subTitle" idx="1"/>
-          </p:nvPr>
-        </p:nvSpPr>
-        <p:spPr>
-          <a:xfrm>
-            <a:off x="640080" y="3405936"/>
-            <a:ext cx="6675120" cy="2466830"/>
-          </a:xfrm>
-        </p:spPr>
-        <p:txBody>
-          <a:bodyPr/>
-          <a:lstStyle/>
-          <a:p>
             <a:endParaRPr lang="en-US" dirty="0"/>
           </a:p>
         </p:txBody>
@@ -1833,38 +1776,6 @@
           </a:p>
         </p:txBody>
       </p:sp>
-      <p:sp>
-        <p:nvSpPr>
-          <p:cNvPr id="3" name="Subtitle 2">
-            <a:extLst>
-              <a:ext uri="{FF2B5EF4-FFF2-40B4-BE49-F238E27FC236}">
-                <a16:creationId xmlns:a16="http://schemas.microsoft.com/office/drawing/2014/main" id="{1EB0192E-BB6B-2796-D8A5-6210C72DEAEC}"/>
-              </a:ext>
-            </a:extLst>
-          </p:cNvPr>
-          <p:cNvSpPr>
-            <a:spLocks noGrp="1"/>
-          </p:cNvSpPr>
-          <p:nvPr>
-            <p:ph type="subTitle" idx="1"/>
-          </p:nvPr>
-        </p:nvSpPr>
-        <p:spPr>
-          <a:xfrm>
-            <a:off x="640950" y="4532626"/>
-            <a:ext cx="3250068" cy="1140304"/>
-          </a:xfrm>
-        </p:spPr>
-        <p:txBody>
-          <a:bodyPr anchor="b">
-            <a:normAutofit/>
-          </a:bodyPr>
-          <a:lstStyle/>
-          <a:p>
-            <a:endParaRPr lang="en-US"/>
-          </a:p>
-        </p:txBody>
-      </p:sp>
       <p:cxnSp>
         <p:nvCxnSpPr>
           <p:cNvPr id="7" name="Straight Connector 6">
@@ -1935,8 +1846,8 @@
         </p:blipFill>
         <p:spPr>
           <a:xfrm>
-            <a:off x="4444723" y="1031001"/>
-            <a:ext cx="4910234" cy="4873408"/>
+            <a:off x="4606477" y="-38745"/>
+            <a:ext cx="6987898" cy="6935490"/>
           </a:xfrm>
           <a:prstGeom prst="rect">
             <a:avLst/>
@@ -1978,7 +1889,7 @@
           <p:cNvPr id="2" name="Title 1">
             <a:extLst>
               <a:ext uri="{FF2B5EF4-FFF2-40B4-BE49-F238E27FC236}">
-                <a16:creationId xmlns:a16="http://schemas.microsoft.com/office/drawing/2014/main" id="{69A19A6E-6BF7-357C-33CD-48A01F4405A2}"/>
+                <a16:creationId xmlns:a16="http://schemas.microsoft.com/office/drawing/2014/main" id="{90FA652C-288A-0381-A88D-242ABA5A6AC7}"/>
               </a:ext>
             </a:extLst>
           </p:cNvPr>
@@ -1995,8 +1906,8 @@
           <a:lstStyle/>
           <a:p>
             <a:r>
-              <a:rPr lang="en-US"/>
-              <a:t>Questions?</a:t>
+              <a:rPr lang="en-US" dirty="0"/>
+              <a:t>Progress Update</a:t>
             </a:r>
           </a:p>
         </p:txBody>
@@ -2006,7 +1917,7 @@
           <p:cNvPr id="3" name="Subtitle 2">
             <a:extLst>
               <a:ext uri="{FF2B5EF4-FFF2-40B4-BE49-F238E27FC236}">
-                <a16:creationId xmlns:a16="http://schemas.microsoft.com/office/drawing/2014/main" id="{AC36D847-5E76-B367-7DF8-CFEA98466B64}"/>
+                <a16:creationId xmlns:a16="http://schemas.microsoft.com/office/drawing/2014/main" id="{81536C7F-2E0E-A0AE-4010-EE8B990344D9}"/>
               </a:ext>
             </a:extLst>
           </p:cNvPr>
@@ -2017,19 +1928,70 @@
             <p:ph type="subTitle" idx="1"/>
           </p:nvPr>
         </p:nvSpPr>
-        <p:spPr/>
+        <p:spPr>
+          <a:xfrm>
+            <a:off x="640080" y="3429001"/>
+            <a:ext cx="6675120" cy="2443766"/>
+          </a:xfrm>
+        </p:spPr>
         <p:txBody>
-          <a:bodyPr/>
+          <a:bodyPr>
+            <a:normAutofit/>
+          </a:bodyPr>
           <a:lstStyle/>
           <a:p>
-            <a:endParaRPr lang="en-US"/>
+            <a:pPr marL="285750" indent="-285750">
+              <a:buFont typeface="Arial" panose="020B0604020202020204" pitchFamily="34" charset="0"/>
+              <a:buChar char="•"/>
+            </a:pPr>
+            <a:r>
+              <a:rPr lang="en-US" dirty="0"/>
+              <a:t>Most main features are near complete</a:t>
+            </a:r>
+          </a:p>
+          <a:p>
+            <a:pPr marL="285750" indent="-285750">
+              <a:buFont typeface="Arial" panose="020B0604020202020204" pitchFamily="34" charset="0"/>
+              <a:buChar char="•"/>
+            </a:pPr>
+            <a:r>
+              <a:rPr lang="en-US" dirty="0"/>
+              <a:t>Scheduling in progress</a:t>
+            </a:r>
+          </a:p>
+          <a:p>
+            <a:pPr marL="285750" indent="-285750">
+              <a:buFont typeface="Arial" panose="020B0604020202020204" pitchFamily="34" charset="0"/>
+              <a:buChar char="•"/>
+            </a:pPr>
+            <a:r>
+              <a:rPr lang="en-US" dirty="0"/>
+              <a:t>Database in progress</a:t>
+            </a:r>
+          </a:p>
+          <a:p>
+            <a:pPr marL="285750" indent="-285750">
+              <a:buFont typeface="Arial" panose="020B0604020202020204" pitchFamily="34" charset="0"/>
+              <a:buChar char="•"/>
+            </a:pPr>
+            <a:r>
+              <a:rPr lang="en-US" dirty="0"/>
+              <a:t>Overall polish</a:t>
+            </a:r>
+          </a:p>
+          <a:p>
+            <a:pPr marL="285750" indent="-285750">
+              <a:buFont typeface="Arial" panose="020B0604020202020204" pitchFamily="34" charset="0"/>
+              <a:buChar char="•"/>
+            </a:pPr>
+            <a:endParaRPr lang="en-US" dirty="0"/>
           </a:p>
         </p:txBody>
       </p:sp>
     </p:spTree>
     <p:extLst>
       <p:ext uri="{BB962C8B-B14F-4D97-AF65-F5344CB8AC3E}">
-        <p14:creationId xmlns:p14="http://schemas.microsoft.com/office/powerpoint/2010/main" val="3217321395"/>
+        <p14:creationId xmlns:p14="http://schemas.microsoft.com/office/powerpoint/2010/main" val="3093161883"/>
       </p:ext>
     </p:extLst>
   </p:cSld>
@@ -2061,7 +2023,7 @@
           <p:cNvPr id="2" name="Title 1">
             <a:extLst>
               <a:ext uri="{FF2B5EF4-FFF2-40B4-BE49-F238E27FC236}">
-                <a16:creationId xmlns:a16="http://schemas.microsoft.com/office/drawing/2014/main" id="{21FCAB83-698B-B3F0-7B51-7ECDCFEFFA2E}"/>
+                <a16:creationId xmlns:a16="http://schemas.microsoft.com/office/drawing/2014/main" id="{69A19A6E-6BF7-357C-33CD-48A01F4405A2}"/>
               </a:ext>
             </a:extLst>
           </p:cNvPr>
@@ -2079,40 +2041,15 @@
           <a:p>
             <a:r>
               <a:rPr lang="en-US"/>
-              <a:t>Thanks For Listening</a:t>
-            </a:r>
-          </a:p>
-        </p:txBody>
-      </p:sp>
-      <p:sp>
-        <p:nvSpPr>
-          <p:cNvPr id="3" name="Subtitle 2">
-            <a:extLst>
-              <a:ext uri="{FF2B5EF4-FFF2-40B4-BE49-F238E27FC236}">
-                <a16:creationId xmlns:a16="http://schemas.microsoft.com/office/drawing/2014/main" id="{15E12216-A848-91D5-D3A3-801B5137FCF7}"/>
-              </a:ext>
-            </a:extLst>
-          </p:cNvPr>
-          <p:cNvSpPr>
-            <a:spLocks noGrp="1"/>
-          </p:cNvSpPr>
-          <p:nvPr>
-            <p:ph type="subTitle" idx="1"/>
-          </p:nvPr>
-        </p:nvSpPr>
-        <p:spPr/>
-        <p:txBody>
-          <a:bodyPr/>
-          <a:lstStyle/>
-          <a:p>
-            <a:endParaRPr lang="en-US"/>
+              <a:t>Questions?</a:t>
+            </a:r>
           </a:p>
         </p:txBody>
       </p:sp>
     </p:spTree>
     <p:extLst>
       <p:ext uri="{BB962C8B-B14F-4D97-AF65-F5344CB8AC3E}">
-        <p14:creationId xmlns:p14="http://schemas.microsoft.com/office/powerpoint/2010/main" val="1449368243"/>
+        <p14:creationId xmlns:p14="http://schemas.microsoft.com/office/powerpoint/2010/main" val="3217321395"/>
       </p:ext>
     </p:extLst>
   </p:cSld>
@@ -2144,7 +2081,7 @@
           <p:cNvPr id="2" name="Title 1">
             <a:extLst>
               <a:ext uri="{FF2B5EF4-FFF2-40B4-BE49-F238E27FC236}">
-                <a16:creationId xmlns:a16="http://schemas.microsoft.com/office/drawing/2014/main" id="{5EC9A88B-7230-46A7-037B-B121802563ED}"/>
+                <a16:creationId xmlns:a16="http://schemas.microsoft.com/office/drawing/2014/main" id="{21FCAB83-698B-B3F0-7B51-7ECDCFEFFA2E}"/>
               </a:ext>
             </a:extLst>
           </p:cNvPr>
@@ -2153,43 +2090,6 @@
           </p:cNvSpPr>
           <p:nvPr>
             <p:ph type="ctrTitle"/>
-          </p:nvPr>
-        </p:nvSpPr>
-        <p:spPr/>
-        <p:txBody>
-          <a:bodyPr>
-            <a:normAutofit/>
-          </a:bodyPr>
-          <a:lstStyle/>
-          <a:p>
-            <a:r>
-              <a:rPr lang="en-US"/>
-              <a:t>Database Model</a:t>
-            </a:r>
-            <a:br>
-              <a:rPr lang="en-US"/>
-            </a:br>
-            <a:r>
-              <a:rPr lang="en-US"/>
-              <a:t>(or at least plans)</a:t>
-            </a:r>
-          </a:p>
-        </p:txBody>
-      </p:sp>
-      <p:sp>
-        <p:nvSpPr>
-          <p:cNvPr id="3" name="Subtitle 2">
-            <a:extLst>
-              <a:ext uri="{FF2B5EF4-FFF2-40B4-BE49-F238E27FC236}">
-                <a16:creationId xmlns:a16="http://schemas.microsoft.com/office/drawing/2014/main" id="{683A63C5-F271-215C-866B-64FC4B656977}"/>
-              </a:ext>
-            </a:extLst>
-          </p:cNvPr>
-          <p:cNvSpPr>
-            <a:spLocks noGrp="1"/>
-          </p:cNvSpPr>
-          <p:nvPr>
-            <p:ph type="subTitle" idx="1"/>
           </p:nvPr>
         </p:nvSpPr>
         <p:spPr/>
@@ -2197,104 +2097,17 @@
           <a:bodyPr/>
           <a:lstStyle/>
           <a:p>
-            <a:endParaRPr lang="en-US"/>
+            <a:r>
+              <a:rPr lang="en-US"/>
+              <a:t>Thanks For Listening</a:t>
+            </a:r>
           </a:p>
         </p:txBody>
       </p:sp>
     </p:spTree>
     <p:extLst>
       <p:ext uri="{BB962C8B-B14F-4D97-AF65-F5344CB8AC3E}">
-        <p14:creationId xmlns:p14="http://schemas.microsoft.com/office/powerpoint/2010/main" val="1572674956"/>
-      </p:ext>
-    </p:extLst>
-  </p:cSld>
-  <p:clrMapOvr>
-    <a:masterClrMapping/>
-  </p:clrMapOvr>
-</p:sld>
-</file>
-
-<file path=ppt/slides/slide9.xml><?xml version="1.0" encoding="utf-8"?>
-<p:sld xmlns:a="http://schemas.openxmlformats.org/drawingml/2006/main" xmlns:r="http://schemas.openxmlformats.org/officeDocument/2006/relationships" xmlns:p="http://schemas.openxmlformats.org/presentationml/2006/main">
-  <p:cSld>
-    <p:spTree>
-      <p:nvGrpSpPr>
-        <p:cNvPr id="1" name=""/>
-        <p:cNvGrpSpPr/>
-        <p:nvPr/>
-      </p:nvGrpSpPr>
-      <p:grpSpPr>
-        <a:xfrm>
-          <a:off x="0" y="0"/>
-          <a:ext cx="0" cy="0"/>
-          <a:chOff x="0" y="0"/>
-          <a:chExt cx="0" cy="0"/>
-        </a:xfrm>
-      </p:grpSpPr>
-      <p:sp>
-        <p:nvSpPr>
-          <p:cNvPr id="2" name="Title 1">
-            <a:extLst>
-              <a:ext uri="{FF2B5EF4-FFF2-40B4-BE49-F238E27FC236}">
-                <a16:creationId xmlns:a16="http://schemas.microsoft.com/office/drawing/2014/main" id="{4E0A3434-5241-144A-CD91-6AEE420D9C98}"/>
-              </a:ext>
-            </a:extLst>
-          </p:cNvPr>
-          <p:cNvSpPr>
-            <a:spLocks noGrp="1"/>
-          </p:cNvSpPr>
-          <p:nvPr>
-            <p:ph type="ctrTitle"/>
-          </p:nvPr>
-        </p:nvSpPr>
-        <p:spPr/>
-        <p:txBody>
-          <a:bodyPr/>
-          <a:lstStyle/>
-          <a:p>
-            <a:r>
-              <a:rPr lang="en-US"/>
-              <a:t>Human Technology Interaction Model</a:t>
-            </a:r>
-            <a:br>
-              <a:rPr lang="en-US"/>
-            </a:br>
-            <a:r>
-              <a:rPr lang="en-US"/>
-              <a:t>(or at least plans)</a:t>
-            </a:r>
-          </a:p>
-        </p:txBody>
-      </p:sp>
-      <p:sp>
-        <p:nvSpPr>
-          <p:cNvPr id="3" name="Subtitle 2">
-            <a:extLst>
-              <a:ext uri="{FF2B5EF4-FFF2-40B4-BE49-F238E27FC236}">
-                <a16:creationId xmlns:a16="http://schemas.microsoft.com/office/drawing/2014/main" id="{0F0F0F42-227A-BA70-072C-BAE86743CD48}"/>
-              </a:ext>
-            </a:extLst>
-          </p:cNvPr>
-          <p:cNvSpPr>
-            <a:spLocks noGrp="1"/>
-          </p:cNvSpPr>
-          <p:nvPr>
-            <p:ph type="subTitle" idx="1"/>
-          </p:nvPr>
-        </p:nvSpPr>
-        <p:spPr/>
-        <p:txBody>
-          <a:bodyPr/>
-          <a:lstStyle/>
-          <a:p>
-            <a:endParaRPr lang="en-US"/>
-          </a:p>
-        </p:txBody>
-      </p:sp>
-    </p:spTree>
-    <p:extLst>
-      <p:ext uri="{BB962C8B-B14F-4D97-AF65-F5344CB8AC3E}">
-        <p14:creationId xmlns:p14="http://schemas.microsoft.com/office/powerpoint/2010/main" val="2539600194"/>
+        <p14:creationId xmlns:p14="http://schemas.microsoft.com/office/powerpoint/2010/main" val="1449368243"/>
       </p:ext>
     </p:extLst>
   </p:cSld>

</xml_diff>